<commit_message>
Updated image backgrounds + minor textual changes
When moving around the columns, I moved some images to different columns
with different backgrounds. So, I changed the backgrounds to match.

Also some minor textual changes.
</commit_message>
<xml_diff>
--- a/eecs-poster-session-2012.pptx
+++ b/eecs-poster-session-2012.pptx
@@ -3449,7 +3449,7 @@
         <p:spPr>
           <a:xfrm>
             <a:off x="137160" y="159840"/>
-            <a:ext cx="2606040" cy="1499760"/>
+            <a:ext cx="2606040" cy="1391760"/>
           </a:xfrm>
           <a:prstGeom prst="rect">
             <a:avLst/>
@@ -3472,8 +3472,8 @@
         </p:nvSpPr>
         <p:spPr>
           <a:xfrm>
-            <a:off x="137160" y="1714320"/>
-            <a:ext cx="2606040" cy="5010840"/>
+            <a:off x="137160" y="1622880"/>
+            <a:ext cx="2606040" cy="5102280"/>
           </a:xfrm>
           <a:prstGeom prst="rect">
             <a:avLst/>
@@ -3747,9 +3747,173 @@
           </a:p>
         </p:txBody>
       </p:sp>
+      <p:sp>
+        <p:nvSpPr>
+          <p:cNvPr id="105" name="TextShape 14"/>
+          <p:cNvSpPr txBox="1"/>
+          <p:nvPr/>
+        </p:nvSpPr>
+        <p:spPr>
+          <a:xfrm>
+            <a:off x="2834640" y="3563280"/>
+            <a:ext cx="2787840" cy="983160"/>
+          </a:xfrm>
+          <a:prstGeom prst="rect">
+            <a:avLst/>
+          </a:prstGeom>
+        </p:spPr>
+        <p:txBody>
+          <a:bodyPr bIns="45000" lIns="90000" rIns="90000" tIns="45000" wrap="none"/>
+          <a:p>
+            <a:pPr algn="ctr"/>
+            <a:r>
+              <a:rPr b="1" lang="en-US" sz="1300">
+                <a:solidFill>
+                  <a:srgbClr val="99284c"/>
+                </a:solidFill>
+              </a:rPr>
+              <a:t>Gradient Descent</a:t>
+            </a:r>
+            <a:endParaRPr/>
+          </a:p>
+          <a:p>
+            <a:endParaRPr/>
+          </a:p>
+          <a:p>
+            <a:pPr>
+              <a:buSzPct val="45000"/>
+              <a:buFont typeface="StarSymbol"/>
+              <a:buChar char=""/>
+            </a:pPr>
+            <a:r>
+              <a:rPr lang="en-US" sz="700"/>
+              <a:t>Surfaces represented as polylines with circular cross-sections</a:t>
+            </a:r>
+            <a:endParaRPr/>
+          </a:p>
+          <a:p>
+            <a:pPr>
+              <a:buSzPct val="45000"/>
+              <a:buFont typeface="StarSymbol"/>
+              <a:buChar char=""/>
+            </a:pPr>
+            <a:r>
+              <a:rPr lang="en-US" sz="700"/>
+              <a:t>Optimization via Gradient Descent</a:t>
+            </a:r>
+            <a:endParaRPr/>
+          </a:p>
+          <a:p>
+            <a:pPr lvl="1">
+              <a:buSzPct val="45000"/>
+              <a:buFont typeface="StarSymbol"/>
+              <a:buChar char=""/>
+            </a:pPr>
+            <a:r>
+              <a:rPr lang="en-US" sz="700"/>
+              <a:t>Vary the coordinates of each control point (parameters), revert change  if energy does not decrease</a:t>
+            </a:r>
+            <a:endParaRPr/>
+          </a:p>
+          <a:p>
+            <a:pPr lvl="1">
+              <a:buSzPct val="45000"/>
+              <a:buFont typeface="StarSymbol"/>
+              <a:buChar char=""/>
+            </a:pPr>
+            <a:r>
+              <a:rPr lang="en-US" sz="700"/>
+              <a:t>Iterate, then stop when no decrease possible</a:t>
+            </a:r>
+            <a:endParaRPr/>
+          </a:p>
+          <a:p>
+            <a:pPr lvl="1">
+              <a:buSzPct val="45000"/>
+              <a:buFont typeface="StarSymbol"/>
+              <a:buChar char=""/>
+            </a:pPr>
+            <a:r>
+              <a:rPr lang="en-US" sz="700"/>
+              <a:t>Susceptible to local </a:t>
+            </a:r>
+            <a:r>
+              <a:rPr lang="en-US" sz="700"/>
+              <a:t>minima</a:t>
+            </a:r>
+            <a:r>
+              <a:rPr lang="en-US" sz="700"/>
+              <a:t> in energy functional</a:t>
+            </a:r>
+            <a:endParaRPr/>
+          </a:p>
+        </p:txBody>
+      </p:sp>
+      <p:sp>
+        <p:nvSpPr>
+          <p:cNvPr id="106" name="TextShape 15"/>
+          <p:cNvSpPr txBox="1"/>
+          <p:nvPr/>
+        </p:nvSpPr>
+        <p:spPr>
+          <a:xfrm>
+            <a:off x="5761440" y="4679280"/>
+            <a:ext cx="3611160" cy="744480"/>
+          </a:xfrm>
+          <a:prstGeom prst="rect">
+            <a:avLst/>
+          </a:prstGeom>
+        </p:spPr>
+        <p:txBody>
+          <a:bodyPr bIns="45000" lIns="90000" rIns="90000" tIns="45000" wrap="none"/>
+          <a:p>
+            <a:pPr algn="ctr"/>
+            <a:r>
+              <a:rPr b="1" lang="en-US" sz="1300">
+                <a:solidFill>
+                  <a:srgbClr val="314004"/>
+                </a:solidFill>
+              </a:rPr>
+              <a:t>Future Work</a:t>
+            </a:r>
+            <a:endParaRPr/>
+          </a:p>
+          <a:p>
+            <a:endParaRPr/>
+          </a:p>
+          <a:p>
+            <a:pPr>
+              <a:buSzPct val="45000"/>
+              <a:buFont typeface="StarSymbol"/>
+              <a:buChar char=""/>
+            </a:pPr>
+            <a:r>
+              <a:rPr lang="en-US" sz="800"/>
+              <a:t>Fully gridded parameterization of surface</a:t>
+            </a:r>
+            <a:endParaRPr/>
+          </a:p>
+          <a:p>
+            <a:pPr lvl="1">
+              <a:buSzPct val="45000"/>
+              <a:buFont typeface="StarSymbol"/>
+              <a:buChar char=""/>
+            </a:pPr>
+            <a:r>
+              <a:rPr lang="en-US" sz="800"/>
+              <a:t>Requires many control points, so many parameters over which to optimize</a:t>
+            </a:r>
+            <a:r>
+              <a:rPr lang="en-US" sz="1000"/>
+              <a:t> </a:t>
+            </a:r>
+            <a:endParaRPr/>
+          </a:p>
+        </p:txBody>
+      </p:sp>
       <p:pic>
         <p:nvPicPr>
-          <p:cNvPr descr="" id="105" name=""/>
+          <p:cNvPr descr="" id="107" name=""/>
           <p:cNvPicPr/>
           <p:nvPr/>
         </p:nvPicPr>
@@ -3761,17 +3925,175 @@
         </p:blipFill>
         <p:spPr>
           <a:xfrm>
-            <a:off x="2994480" y="833040"/>
-            <a:ext cx="1234440" cy="768240"/>
+            <a:off x="769320" y="4133160"/>
+            <a:ext cx="1463040" cy="1060560"/>
           </a:xfrm>
           <a:prstGeom prst="rect">
             <a:avLst/>
           </a:prstGeom>
         </p:spPr>
       </p:pic>
+      <p:sp>
+        <p:nvSpPr>
+          <p:cNvPr id="108" name="TextShape 16"/>
+          <p:cNvSpPr txBox="1"/>
+          <p:nvPr/>
+        </p:nvSpPr>
+        <p:spPr>
+          <a:xfrm>
+            <a:off x="1089360" y="4178880"/>
+            <a:ext cx="914400" cy="176040"/>
+          </a:xfrm>
+          <a:prstGeom prst="rect">
+            <a:avLst/>
+          </a:prstGeom>
+        </p:spPr>
+        <p:txBody>
+          <a:bodyPr bIns="45000" lIns="90000" rIns="90000" tIns="45000" wrap="none"/>
+          <a:p>
+            <a:pPr algn="ctr"/>
+            <a:r>
+              <a:rPr b="1" lang="en-US" sz="600"/>
+              <a:t>Klein-bottle mouths</a:t>
+            </a:r>
+            <a:endParaRPr/>
+          </a:p>
+        </p:txBody>
+      </p:sp>
+      <p:sp>
+        <p:nvSpPr>
+          <p:cNvPr id="109" name="Line 17"/>
+          <p:cNvSpPr/>
+          <p:nvPr/>
+        </p:nvSpPr>
+        <p:spPr>
+          <a:xfrm>
+            <a:off x="1203840" y="4316040"/>
+            <a:ext cx="45720" cy="274320"/>
+          </a:xfrm>
+          <a:prstGeom prst="line">
+            <a:avLst/>
+          </a:prstGeom>
+          <a:ln w="9000">
+            <a:solidFill>
+              <a:srgbClr val="000000"/>
+            </a:solidFill>
+            <a:round/>
+            <a:tailEnd len="med" type="triangle" w="med"/>
+          </a:ln>
+        </p:spPr>
+      </p:sp>
+      <p:sp>
+        <p:nvSpPr>
+          <p:cNvPr id="110" name="Line 18"/>
+          <p:cNvSpPr/>
+          <p:nvPr/>
+        </p:nvSpPr>
+        <p:spPr>
+          <a:xfrm>
+            <a:off x="1912320" y="4316040"/>
+            <a:ext cx="0" cy="502920"/>
+          </a:xfrm>
+          <a:prstGeom prst="line">
+            <a:avLst/>
+          </a:prstGeom>
+          <a:ln w="9000">
+            <a:solidFill>
+              <a:srgbClr val="000000"/>
+            </a:solidFill>
+            <a:round/>
+            <a:tailEnd len="med" type="triangle" w="med"/>
+          </a:ln>
+        </p:spPr>
+      </p:sp>
+      <p:sp>
+        <p:nvSpPr>
+          <p:cNvPr id="111" name="TextShape 19"/>
+          <p:cNvSpPr txBox="1"/>
+          <p:nvPr/>
+        </p:nvSpPr>
+        <p:spPr>
+          <a:xfrm>
+            <a:off x="695520" y="5216040"/>
+            <a:ext cx="1600200" cy="288360"/>
+          </a:xfrm>
+          <a:prstGeom prst="rect">
+            <a:avLst/>
+          </a:prstGeom>
+        </p:spPr>
+        <p:txBody>
+          <a:bodyPr bIns="45000" lIns="90000" rIns="90000" tIns="45000" wrap="none"/>
+          <a:p>
+            <a:r>
+              <a:rPr lang="en-US" sz="700"/>
+              <a:t>Torus eversion, rendered by Chéritat</a:t>
+            </a:r>
+            <a:endParaRPr/>
+          </a:p>
+        </p:txBody>
+      </p:sp>
+      <p:sp>
+        <p:nvSpPr>
+          <p:cNvPr id="112" name="CustomShape 20"/>
+          <p:cNvSpPr/>
+          <p:nvPr/>
+        </p:nvSpPr>
+        <p:spPr>
+          <a:xfrm>
+            <a:off x="180000" y="3107520"/>
+            <a:ext cx="2563200" cy="739800"/>
+          </a:xfrm>
+          <a:prstGeom prst="rect">
+            <a:avLst/>
+          </a:prstGeom>
+        </p:spPr>
+        <p:txBody>
+          <a:bodyPr bIns="45000" lIns="90000" rIns="90000" tIns="45000"/>
+          <a:p>
+            <a:pPr algn="ctr"/>
+            <a:r>
+              <a:rPr b="1" lang="en-US" sz="1300">
+                <a:solidFill>
+                  <a:srgbClr val="000080"/>
+                </a:solidFill>
+              </a:rPr>
+              <a:t>Torus Eversion</a:t>
+            </a:r>
+            <a:endParaRPr/>
+          </a:p>
+          <a:p>
+            <a:pPr algn="ctr"/>
+            <a:endParaRPr/>
+          </a:p>
+          <a:p>
+            <a:pPr>
+              <a:buSzPct val="45000"/>
+              <a:buFont typeface="StarSymbol"/>
+              <a:buChar char=""/>
+            </a:pPr>
+            <a:r>
+              <a:rPr lang="en-US" sz="800"/>
+              <a:t>Turn an torus inside-out by deforming it into two Klein-bottle mouths attached to each other</a:t>
+            </a:r>
+            <a:endParaRPr/>
+          </a:p>
+          <a:p>
+            <a:pPr>
+              <a:buSzPct val="45000"/>
+              <a:buFont typeface="StarSymbol"/>
+              <a:buChar char=""/>
+            </a:pPr>
+            <a:r>
+              <a:rPr lang="en-US" sz="800"/>
+              <a:t>Proceed from symmetrical halfway point by minimizing energy. Can we find such an energy functional?</a:t>
+            </a:r>
+            <a:endParaRPr/>
+          </a:p>
+        </p:txBody>
+      </p:sp>
       <p:pic>
         <p:nvPicPr>
-          <p:cNvPr descr="" id="106" name=""/>
+          <p:cNvPr descr="" id="113" name=""/>
           <p:cNvPicPr/>
           <p:nvPr/>
         </p:nvPicPr>
@@ -3783,17 +4105,44 @@
         </p:blipFill>
         <p:spPr>
           <a:xfrm>
-            <a:off x="4294080" y="833040"/>
-            <a:ext cx="1234440" cy="768240"/>
+            <a:off x="695520" y="5422680"/>
+            <a:ext cx="1600560" cy="1060200"/>
           </a:xfrm>
           <a:prstGeom prst="rect">
             <a:avLst/>
           </a:prstGeom>
         </p:spPr>
       </p:pic>
+      <p:sp>
+        <p:nvSpPr>
+          <p:cNvPr id="114" name="TextShape 21"/>
+          <p:cNvSpPr txBox="1"/>
+          <p:nvPr/>
+        </p:nvSpPr>
+        <p:spPr>
+          <a:xfrm>
+            <a:off x="137160" y="6508440"/>
+            <a:ext cx="2606040" cy="189360"/>
+          </a:xfrm>
+          <a:prstGeom prst="rect">
+            <a:avLst/>
+          </a:prstGeom>
+        </p:spPr>
+        <p:txBody>
+          <a:bodyPr bIns="45000" lIns="90000" rIns="90000" tIns="45000" wrap="none"/>
+          <a:p>
+            <a:pPr algn="ctr"/>
+            <a:r>
+              <a:rPr lang="en-US" sz="700"/>
+              <a:t>A possible halfway point in the eversion process.</a:t>
+            </a:r>
+            <a:endParaRPr/>
+          </a:p>
+        </p:txBody>
+      </p:sp>
       <p:pic>
         <p:nvPicPr>
-          <p:cNvPr descr="" id="107" name=""/>
+          <p:cNvPr descr="" id="115" name=""/>
           <p:cNvPicPr/>
           <p:nvPr/>
         </p:nvPicPr>
@@ -3805,17 +4154,51 @@
         </p:blipFill>
         <p:spPr>
           <a:xfrm>
-            <a:off x="2991240" y="1791720"/>
-            <a:ext cx="1234440" cy="612720"/>
+            <a:off x="5965200" y="825840"/>
+            <a:ext cx="914400" cy="914400"/>
           </a:xfrm>
           <a:prstGeom prst="rect">
             <a:avLst/>
           </a:prstGeom>
         </p:spPr>
       </p:pic>
+      <p:sp>
+        <p:nvSpPr>
+          <p:cNvPr id="116" name="TextShape 22"/>
+          <p:cNvSpPr txBox="1"/>
+          <p:nvPr/>
+        </p:nvSpPr>
+        <p:spPr>
+          <a:xfrm>
+            <a:off x="5919840" y="446400"/>
+            <a:ext cx="3383280" cy="347400"/>
+          </a:xfrm>
+          <a:prstGeom prst="rect">
+            <a:avLst/>
+          </a:prstGeom>
+        </p:spPr>
+        <p:txBody>
+          <a:bodyPr bIns="45000" lIns="90000" rIns="90000" tIns="45000" wrap="none"/>
+          <a:p>
+            <a:r>
+              <a:rPr b="1" lang="en-US" sz="600"/>
+              <a:t>A halfway point:</a:t>
+            </a:r>
+            <a:r>
+              <a:rPr lang="en-US" sz="600"/>
+              <a:t> </a:t>
+            </a:r>
+            <a:r>
+              <a:rPr lang="en-US" sz="600"/>
+              <a:t>First approach. Model two arms as separate, non-closed space curves, connected by end caps (not shown). Minimize  bending and twist of each arm separately. Both arms incur 180° twist for a total of 360° twist across both arms.</a:t>
+            </a:r>
+            <a:endParaRPr/>
+          </a:p>
+        </p:txBody>
+      </p:sp>
       <p:pic>
         <p:nvPicPr>
-          <p:cNvPr descr="" id="108" name=""/>
+          <p:cNvPr descr="" id="117" name=""/>
           <p:cNvPicPr/>
           <p:nvPr/>
         </p:nvPicPr>
@@ -3827,17 +4210,43 @@
         </p:blipFill>
         <p:spPr>
           <a:xfrm>
-            <a:off x="4293720" y="1787040"/>
-            <a:ext cx="1234440" cy="612720"/>
+            <a:off x="8000640" y="819000"/>
+            <a:ext cx="612720" cy="914400"/>
           </a:xfrm>
           <a:prstGeom prst="rect">
             <a:avLst/>
           </a:prstGeom>
         </p:spPr>
       </p:pic>
+      <p:sp>
+        <p:nvSpPr>
+          <p:cNvPr id="118" name="TextShape 23"/>
+          <p:cNvSpPr txBox="1"/>
+          <p:nvPr/>
+        </p:nvSpPr>
+        <p:spPr>
+          <a:xfrm>
+            <a:off x="8701920" y="779040"/>
+            <a:ext cx="624960" cy="1028520"/>
+          </a:xfrm>
+          <a:prstGeom prst="rect">
+            <a:avLst/>
+          </a:prstGeom>
+        </p:spPr>
+        <p:txBody>
+          <a:bodyPr bIns="45000" lIns="90000" rIns="90000" tIns="45000" wrap="none"/>
+          <a:p>
+            <a:r>
+              <a:rPr lang="en-US" sz="600"/>
+              <a:t>The stripe on the right arm is shown here. If an ant were to walk on the stripe, it would end up rotating 180°.</a:t>
+            </a:r>
+            <a:endParaRPr/>
+          </a:p>
+        </p:txBody>
+      </p:sp>
       <p:pic>
         <p:nvPicPr>
-          <p:cNvPr descr="" id="109" name=""/>
+          <p:cNvPr descr="" id="119" name=""/>
           <p:cNvPicPr/>
           <p:nvPr/>
         </p:nvPicPr>
@@ -3849,8 +4258,8 @@
         </p:blipFill>
         <p:spPr>
           <a:xfrm>
-            <a:off x="4143240" y="2738160"/>
-            <a:ext cx="1234440" cy="612720"/>
+            <a:off x="6998760" y="829080"/>
+            <a:ext cx="914400" cy="914400"/>
           </a:xfrm>
           <a:prstGeom prst="rect">
             <a:avLst/>
@@ -3859,14 +4268,14 @@
       </p:pic>
       <p:sp>
         <p:nvSpPr>
-          <p:cNvPr id="110" name="TextShape 14"/>
+          <p:cNvPr id="120" name="TextShape 24"/>
           <p:cNvSpPr txBox="1"/>
           <p:nvPr/>
         </p:nvSpPr>
         <p:spPr>
           <a:xfrm>
-            <a:off x="2834640" y="3563280"/>
-            <a:ext cx="2787840" cy="983160"/>
+            <a:off x="5893200" y="1824840"/>
+            <a:ext cx="3383280" cy="347400"/>
           </a:xfrm>
           <a:prstGeom prst="rect">
             <a:avLst/>
@@ -3875,147 +4284,13 @@
         <p:txBody>
           <a:bodyPr bIns="45000" lIns="90000" rIns="90000" tIns="45000" wrap="none"/>
           <a:p>
-            <a:pPr algn="ctr"/>
-            <a:r>
-              <a:rPr b="1" lang="en-US" sz="1300">
-                <a:solidFill>
-                  <a:srgbClr val="99284c"/>
-                </a:solidFill>
-              </a:rPr>
-              <a:t>Gradient Descent</a:t>
-            </a:r>
-            <a:endParaRPr/>
-          </a:p>
-          <a:p>
-            <a:endParaRPr/>
-          </a:p>
-          <a:p>
-            <a:pPr>
-              <a:buSzPct val="45000"/>
-              <a:buFont typeface="StarSymbol"/>
-              <a:buChar char=""/>
-            </a:pPr>
-            <a:r>
-              <a:rPr lang="en-US" sz="700"/>
-              <a:t>Surfaces represented as polylines with circular cross-sections</a:t>
-            </a:r>
-            <a:endParaRPr/>
-          </a:p>
-          <a:p>
-            <a:pPr>
-              <a:buSzPct val="45000"/>
-              <a:buFont typeface="StarSymbol"/>
-              <a:buChar char=""/>
-            </a:pPr>
-            <a:r>
-              <a:rPr lang="en-US" sz="700"/>
-              <a:t>Optimization via Gradient Descent</a:t>
-            </a:r>
-            <a:endParaRPr/>
-          </a:p>
-          <a:p>
-            <a:pPr lvl="1">
-              <a:buSzPct val="45000"/>
-              <a:buFont typeface="StarSymbol"/>
-              <a:buChar char=""/>
-            </a:pPr>
-            <a:r>
-              <a:rPr lang="en-US" sz="700"/>
-              <a:t>Vary the coordinates of each control point (parameters), revert change  if energy does not decrease</a:t>
-            </a:r>
-            <a:endParaRPr/>
-          </a:p>
-          <a:p>
-            <a:pPr lvl="1">
-              <a:buSzPct val="45000"/>
-              <a:buFont typeface="StarSymbol"/>
-              <a:buChar char=""/>
-            </a:pPr>
-            <a:r>
-              <a:rPr lang="en-US" sz="700"/>
-              <a:t>Iterate, then stop when no decrease possible</a:t>
-            </a:r>
-            <a:endParaRPr/>
-          </a:p>
-          <a:p>
-            <a:pPr lvl="1">
-              <a:buSzPct val="45000"/>
-              <a:buFont typeface="StarSymbol"/>
-              <a:buChar char=""/>
-            </a:pPr>
-            <a:r>
-              <a:rPr lang="en-US" sz="700"/>
-              <a:t>Susceptible to local </a:t>
-            </a:r>
-            <a:r>
-              <a:rPr lang="en-US" sz="700"/>
-              <a:t>minima</a:t>
-            </a:r>
-            <a:r>
-              <a:rPr lang="en-US" sz="700"/>
-              <a:t> in energy functional</a:t>
-            </a:r>
-            <a:endParaRPr/>
-          </a:p>
-        </p:txBody>
-      </p:sp>
-      <p:sp>
-        <p:nvSpPr>
-          <p:cNvPr id="111" name="TextShape 15"/>
-          <p:cNvSpPr txBox="1"/>
-          <p:nvPr/>
-        </p:nvSpPr>
-        <p:spPr>
-          <a:xfrm>
-            <a:off x="5761440" y="4679280"/>
-            <a:ext cx="3611160" cy="744480"/>
-          </a:xfrm>
-          <a:prstGeom prst="rect">
-            <a:avLst/>
-          </a:prstGeom>
-        </p:spPr>
-        <p:txBody>
-          <a:bodyPr bIns="45000" lIns="90000" rIns="90000" tIns="45000" wrap="none"/>
-          <a:p>
-            <a:pPr algn="ctr"/>
-            <a:r>
-              <a:rPr b="1" lang="en-US" sz="1300">
-                <a:solidFill>
-                  <a:srgbClr val="314004"/>
-                </a:solidFill>
-              </a:rPr>
-              <a:t>Future Work</a:t>
-            </a:r>
-            <a:endParaRPr/>
-          </a:p>
-          <a:p>
-            <a:endParaRPr/>
-          </a:p>
-          <a:p>
-            <a:pPr>
-              <a:buSzPct val="45000"/>
-              <a:buFont typeface="StarSymbol"/>
-              <a:buChar char=""/>
-            </a:pPr>
-            <a:r>
-              <a:rPr lang="en-US" sz="800"/>
-              <a:t>Fully gridded parameterization of surface</a:t>
-            </a:r>
-            <a:endParaRPr/>
-          </a:p>
-          <a:p>
-            <a:pPr lvl="1">
-              <a:buSzPct val="45000"/>
-              <a:buFont typeface="StarSymbol"/>
-              <a:buChar char=""/>
-            </a:pPr>
-            <a:r>
-              <a:rPr lang="en-US" sz="800"/>
-              <a:t>Requires many control points, so many parameters over which to optimize</a:t>
-            </a:r>
-            <a:r>
-              <a:rPr lang="en-US" sz="1000"/>
-              <a:t> </a:t>
+            <a:r>
+              <a:rPr b="1" lang="en-US" sz="600"/>
+              <a:t>Straightening out one arm:</a:t>
+            </a:r>
+            <a:r>
+              <a:rPr lang="en-US" sz="600"/>
+              <a:t> By allowing the green arm to straighten and the end caps to come closer together, the red arm is forced to incur all 360° of twist. The twist is then removed by folding the red arm until it is untwisted.</a:t>
             </a:r>
             <a:endParaRPr/>
           </a:p>
@@ -4023,7 +4298,7 @@
       </p:sp>
       <p:pic>
         <p:nvPicPr>
-          <p:cNvPr descr="" id="112" name=""/>
+          <p:cNvPr descr="" id="121" name=""/>
           <p:cNvPicPr/>
           <p:nvPr/>
         </p:nvPicPr>
@@ -4035,24 +4310,90 @@
         </p:blipFill>
         <p:spPr>
           <a:xfrm>
-            <a:off x="769320" y="3989160"/>
-            <a:ext cx="1463040" cy="1060560"/>
+            <a:off x="5831280" y="2178000"/>
+            <a:ext cx="914400" cy="914400"/>
           </a:xfrm>
           <a:prstGeom prst="rect">
             <a:avLst/>
           </a:prstGeom>
         </p:spPr>
       </p:pic>
-      <p:sp>
-        <p:nvSpPr>
-          <p:cNvPr id="113" name="TextShape 16"/>
+      <p:pic>
+        <p:nvPicPr>
+          <p:cNvPr descr="" id="122" name=""/>
+          <p:cNvPicPr/>
+          <p:nvPr/>
+        </p:nvPicPr>
+        <p:blipFill>
+          <a:blip r:embed="rId7"/>
+          <a:stretch>
+            <a:fillRect/>
+          </a:stretch>
+        </p:blipFill>
+        <p:spPr>
+          <a:xfrm>
+            <a:off x="7631280" y="2178000"/>
+            <a:ext cx="914400" cy="914400"/>
+          </a:xfrm>
+          <a:prstGeom prst="rect">
+            <a:avLst/>
+          </a:prstGeom>
+        </p:spPr>
+      </p:pic>
+      <p:pic>
+        <p:nvPicPr>
+          <p:cNvPr descr="" id="123" name=""/>
+          <p:cNvPicPr/>
+          <p:nvPr/>
+        </p:nvPicPr>
+        <p:blipFill>
+          <a:blip r:embed="rId8"/>
+          <a:stretch>
+            <a:fillRect/>
+          </a:stretch>
+        </p:blipFill>
+        <p:spPr>
+          <a:xfrm>
+            <a:off x="8459280" y="2178000"/>
+            <a:ext cx="914400" cy="914400"/>
+          </a:xfrm>
+          <a:prstGeom prst="rect">
+            <a:avLst/>
+          </a:prstGeom>
+        </p:spPr>
+      </p:pic>
+      <p:pic>
+        <p:nvPicPr>
+          <p:cNvPr descr="" id="124" name=""/>
+          <p:cNvPicPr/>
+          <p:nvPr/>
+        </p:nvPicPr>
+        <p:blipFill>
+          <a:blip r:embed="rId9"/>
+          <a:stretch>
+            <a:fillRect/>
+          </a:stretch>
+        </p:blipFill>
+        <p:spPr>
+          <a:xfrm>
+            <a:off x="6739200" y="2182320"/>
+            <a:ext cx="914400" cy="914400"/>
+          </a:xfrm>
+          <a:prstGeom prst="rect">
+            <a:avLst/>
+          </a:prstGeom>
+        </p:spPr>
+      </p:pic>
+      <p:sp>
+        <p:nvSpPr>
+          <p:cNvPr id="125" name="TextShape 25"/>
           <p:cNvSpPr txBox="1"/>
           <p:nvPr/>
         </p:nvSpPr>
         <p:spPr>
           <a:xfrm>
-            <a:off x="1089360" y="4034880"/>
-            <a:ext cx="914400" cy="176040"/>
+            <a:off x="5812200" y="4275360"/>
+            <a:ext cx="3520440" cy="307440"/>
           </a:xfrm>
           <a:prstGeom prst="rect">
             <a:avLst/>
@@ -4061,25 +4402,384 @@
         <p:txBody>
           <a:bodyPr bIns="45000" lIns="90000" rIns="90000" tIns="45000" wrap="none"/>
           <a:p>
-            <a:pPr algn="ctr"/>
             <a:r>
               <a:rPr b="1" lang="en-US" sz="600"/>
-              <a:t>Klein-bottle mouths</a:t>
-            </a:r>
-            <a:endParaRPr/>
-          </a:p>
-        </p:txBody>
-      </p:sp>
-      <p:sp>
-        <p:nvSpPr>
-          <p:cNvPr id="114" name="Line 17"/>
+              <a:t>Collapsing the straight arm:</a:t>
+            </a:r>
+            <a:r>
+              <a:rPr lang="en-US" sz="600"/>
+              <a:t> Finally, the green arm is shortened until it completely collapses and only the inverted torus remains.</a:t>
+            </a:r>
+            <a:endParaRPr/>
+          </a:p>
+        </p:txBody>
+      </p:sp>
+      <p:pic>
+        <p:nvPicPr>
+          <p:cNvPr descr="" id="126" name=""/>
+          <p:cNvPicPr/>
+          <p:nvPr/>
+        </p:nvPicPr>
+        <p:blipFill>
+          <a:blip r:embed="rId10"/>
+          <a:stretch>
+            <a:fillRect/>
+          </a:stretch>
+        </p:blipFill>
+        <p:spPr>
+          <a:xfrm>
+            <a:off x="7039800" y="3175560"/>
+            <a:ext cx="1097280" cy="1097280"/>
+          </a:xfrm>
+          <a:prstGeom prst="rect">
+            <a:avLst/>
+          </a:prstGeom>
+        </p:spPr>
+      </p:pic>
+      <p:pic>
+        <p:nvPicPr>
+          <p:cNvPr descr="" id="127" name=""/>
+          <p:cNvPicPr/>
+          <p:nvPr/>
+        </p:nvPicPr>
+        <p:blipFill>
+          <a:blip r:embed="rId11"/>
+          <a:stretch>
+            <a:fillRect/>
+          </a:stretch>
+        </p:blipFill>
+        <p:spPr>
+          <a:xfrm>
+            <a:off x="5851080" y="3175920"/>
+            <a:ext cx="1097280" cy="1097280"/>
+          </a:xfrm>
+          <a:prstGeom prst="rect">
+            <a:avLst/>
+          </a:prstGeom>
+        </p:spPr>
+      </p:pic>
+      <p:pic>
+        <p:nvPicPr>
+          <p:cNvPr descr="" id="128" name=""/>
+          <p:cNvPicPr/>
+          <p:nvPr/>
+        </p:nvPicPr>
+        <p:blipFill>
+          <a:blip r:embed="rId12"/>
+          <a:stretch>
+            <a:fillRect/>
+          </a:stretch>
+        </p:blipFill>
+        <p:spPr>
+          <a:xfrm>
+            <a:off x="8235360" y="3175560"/>
+            <a:ext cx="1097280" cy="1097280"/>
+          </a:xfrm>
+          <a:prstGeom prst="rect">
+            <a:avLst/>
+          </a:prstGeom>
+        </p:spPr>
+      </p:pic>
+      <p:pic>
+        <p:nvPicPr>
+          <p:cNvPr descr="" id="129" name=""/>
+          <p:cNvPicPr/>
+          <p:nvPr/>
+        </p:nvPicPr>
+        <p:blipFill>
+          <a:blip r:embed="rId13"/>
+          <a:stretch>
+            <a:fillRect/>
+          </a:stretch>
+        </p:blipFill>
+        <p:spPr>
+          <a:xfrm>
+            <a:off x="3012480" y="4845600"/>
+            <a:ext cx="685440" cy="685440"/>
+          </a:xfrm>
+          <a:prstGeom prst="rect">
+            <a:avLst/>
+          </a:prstGeom>
+        </p:spPr>
+      </p:pic>
+      <p:pic>
+        <p:nvPicPr>
+          <p:cNvPr descr="" id="130" name=""/>
+          <p:cNvPicPr/>
+          <p:nvPr/>
+        </p:nvPicPr>
+        <p:blipFill>
+          <a:blip r:embed="rId14"/>
+          <a:stretch>
+            <a:fillRect/>
+          </a:stretch>
+        </p:blipFill>
+        <p:spPr>
+          <a:xfrm>
+            <a:off x="3687840" y="4887000"/>
+            <a:ext cx="566640" cy="603000"/>
+          </a:xfrm>
+          <a:prstGeom prst="rect">
+            <a:avLst/>
+          </a:prstGeom>
+        </p:spPr>
+      </p:pic>
+      <p:pic>
+        <p:nvPicPr>
+          <p:cNvPr descr="" id="131" name=""/>
+          <p:cNvPicPr/>
+          <p:nvPr/>
+        </p:nvPicPr>
+        <p:blipFill>
+          <a:blip r:embed="rId15"/>
+          <a:stretch>
+            <a:fillRect/>
+          </a:stretch>
+        </p:blipFill>
+        <p:spPr>
+          <a:xfrm>
+            <a:off x="4197240" y="4831200"/>
+            <a:ext cx="685440" cy="731160"/>
+          </a:xfrm>
+          <a:prstGeom prst="rect">
+            <a:avLst/>
+          </a:prstGeom>
+        </p:spPr>
+      </p:pic>
+      <p:pic>
+        <p:nvPicPr>
+          <p:cNvPr descr="" id="132" name=""/>
+          <p:cNvPicPr/>
+          <p:nvPr/>
+        </p:nvPicPr>
+        <p:blipFill>
+          <a:blip r:embed="rId16"/>
+          <a:stretch>
+            <a:fillRect/>
+          </a:stretch>
+        </p:blipFill>
+        <p:spPr>
+          <a:xfrm>
+            <a:off x="4854240" y="4875120"/>
+            <a:ext cx="633240" cy="677520"/>
+          </a:xfrm>
+          <a:prstGeom prst="rect">
+            <a:avLst/>
+          </a:prstGeom>
+        </p:spPr>
+      </p:pic>
+      <p:sp>
+        <p:nvSpPr>
+          <p:cNvPr id="133" name="TextShape 26"/>
+          <p:cNvSpPr txBox="1"/>
+          <p:nvPr/>
+        </p:nvSpPr>
+        <p:spPr>
+          <a:xfrm>
+            <a:off x="2834640" y="5615280"/>
+            <a:ext cx="2744640" cy="1082160"/>
+          </a:xfrm>
+          <a:prstGeom prst="rect">
+            <a:avLst/>
+          </a:prstGeom>
+        </p:spPr>
+        <p:txBody>
+          <a:bodyPr bIns="45000" lIns="90000" rIns="90000" tIns="45000" wrap="none"/>
+          <a:p>
+            <a:pPr algn="ctr"/>
+            <a:r>
+              <a:rPr b="1" lang="en-US" sz="1300">
+                <a:solidFill>
+                  <a:srgbClr val="99284c"/>
+                </a:solidFill>
+              </a:rPr>
+              <a:t>Energy Functionals</a:t>
+            </a:r>
+            <a:endParaRPr/>
+          </a:p>
+          <a:p>
+            <a:endParaRPr/>
+          </a:p>
+          <a:p>
+            <a:pPr>
+              <a:buSzPct val="45000"/>
+              <a:buFont typeface="StarSymbol"/>
+              <a:buChar char=""/>
+            </a:pPr>
+            <a:r>
+              <a:rPr b="1" lang="en-US" sz="700"/>
+              <a:t>Bending:</a:t>
+            </a:r>
+            <a:r>
+              <a:rPr lang="en-US" sz="700"/>
+              <a:t> Compute angle between two struts and take deviation from collinearity</a:t>
+            </a:r>
+            <a:endParaRPr/>
+          </a:p>
+          <a:p>
+            <a:pPr>
+              <a:buSzPct val="45000"/>
+              <a:buFont typeface="StarSymbol"/>
+              <a:buChar char=""/>
+            </a:pPr>
+            <a:r>
+              <a:rPr b="1" lang="en-US" sz="700"/>
+              <a:t>Twisting:</a:t>
+            </a:r>
+            <a:r>
+              <a:rPr lang="en-US" sz="700"/>
+              <a:t> Using rotation minimizing frames,</a:t>
+            </a:r>
+            <a:endParaRPr/>
+          </a:p>
+          <a:p>
+            <a:pPr lvl="1">
+              <a:buSzPct val="45000"/>
+              <a:buFont typeface="StarSymbol"/>
+              <a:buChar char=""/>
+            </a:pPr>
+            <a:r>
+              <a:rPr lang="en-US" sz="700"/>
+              <a:t>Closed Curves: compare beginning and end orientations</a:t>
+            </a:r>
+            <a:endParaRPr/>
+          </a:p>
+          <a:p>
+            <a:pPr lvl="1">
+              <a:buSzPct val="45000"/>
+              <a:buFont typeface="StarSymbol"/>
+              <a:buChar char=""/>
+            </a:pPr>
+            <a:r>
+              <a:rPr lang="en-US" sz="700"/>
+              <a:t>Non-closed curves: forward project normal vectors and compare to a priori expected ending orientation</a:t>
+            </a:r>
+            <a:endParaRPr/>
+          </a:p>
+          <a:p>
+            <a:pPr>
+              <a:buSzPct val="45000"/>
+              <a:buFont typeface="StarSymbol"/>
+              <a:buChar char=""/>
+            </a:pPr>
+            <a:r>
+              <a:rPr lang="en-US" sz="700"/>
+              <a:t>Can weigh these parts to trade-off between them</a:t>
+            </a:r>
+            <a:endParaRPr/>
+          </a:p>
+        </p:txBody>
+      </p:sp>
+      <p:sp>
+        <p:nvSpPr>
+          <p:cNvPr id="134" name="TextShape 27"/>
+          <p:cNvSpPr txBox="1"/>
+          <p:nvPr/>
+        </p:nvSpPr>
+        <p:spPr>
+          <a:xfrm>
+            <a:off x="6337440" y="6171480"/>
+            <a:ext cx="868680" cy="433080"/>
+          </a:xfrm>
+          <a:prstGeom prst="rect">
+            <a:avLst/>
+          </a:prstGeom>
+        </p:spPr>
+        <p:txBody>
+          <a:bodyPr bIns="45000" lIns="90000" rIns="90000" tIns="45000" wrap="none"/>
+          <a:p>
+            <a:r>
+              <a:rPr lang="en-US" sz="600"/>
+              <a:t>Bending calculated as deviation of adjacent patches from co-planarity</a:t>
+            </a:r>
+            <a:endParaRPr/>
+          </a:p>
+        </p:txBody>
+      </p:sp>
+      <p:sp>
+        <p:nvSpPr>
+          <p:cNvPr id="135" name="TextShape 28"/>
+          <p:cNvSpPr txBox="1"/>
+          <p:nvPr/>
+        </p:nvSpPr>
+        <p:spPr>
+          <a:xfrm>
+            <a:off x="8065800" y="6171840"/>
+            <a:ext cx="868680" cy="433080"/>
+          </a:xfrm>
+          <a:prstGeom prst="rect">
+            <a:avLst/>
+          </a:prstGeom>
+        </p:spPr>
+        <p:txBody>
+          <a:bodyPr bIns="45000" lIns="90000" rIns="90000" tIns="45000" wrap="none"/>
+          <a:p>
+            <a:r>
+              <a:rPr lang="en-US" sz="600"/>
+              <a:t>Twisting calculated based on deviation of edges from right angles.</a:t>
+            </a:r>
+            <a:endParaRPr/>
+          </a:p>
+        </p:txBody>
+      </p:sp>
+      <p:pic>
+        <p:nvPicPr>
+          <p:cNvPr descr="" id="136" name=""/>
+          <p:cNvPicPr/>
+          <p:nvPr/>
+        </p:nvPicPr>
+        <p:blipFill>
+          <a:blip r:embed="rId17"/>
+          <a:stretch>
+            <a:fillRect/>
+          </a:stretch>
+        </p:blipFill>
+        <p:spPr>
+          <a:xfrm>
+            <a:off x="6455520" y="5449680"/>
+            <a:ext cx="2286000" cy="768240"/>
+          </a:xfrm>
+          <a:prstGeom prst="rect">
+            <a:avLst/>
+          </a:prstGeom>
+        </p:spPr>
+      </p:pic>
+      <p:sp>
+        <p:nvSpPr>
+          <p:cNvPr id="137" name="TextShape 29"/>
+          <p:cNvSpPr txBox="1"/>
+          <p:nvPr/>
+        </p:nvSpPr>
+        <p:spPr>
+          <a:xfrm>
+            <a:off x="7183080" y="6439680"/>
+            <a:ext cx="891720" cy="261720"/>
+          </a:xfrm>
+          <a:prstGeom prst="rect">
+            <a:avLst/>
+          </a:prstGeom>
+        </p:spPr>
+        <p:txBody>
+          <a:bodyPr bIns="45000" lIns="90000" rIns="90000" tIns="45000" wrap="none"/>
+          <a:p>
+            <a:r>
+              <a:rPr lang="en-US" sz="600"/>
+              <a:t>Integrate these over entire surface area</a:t>
+            </a:r>
+            <a:endParaRPr/>
+          </a:p>
+        </p:txBody>
+      </p:sp>
+      <p:sp>
+        <p:nvSpPr>
+          <p:cNvPr id="138" name="Line 30"/>
           <p:cNvSpPr/>
           <p:nvPr/>
         </p:nvSpPr>
         <p:spPr>
-          <a:xfrm>
-            <a:off x="1203840" y="4172040"/>
-            <a:ext cx="45720" cy="274320"/>
+          <a:xfrm flipH="1" flipV="1">
+            <a:off x="7114680" y="6335640"/>
+            <a:ext cx="137160" cy="137160"/>
           </a:xfrm>
           <a:prstGeom prst="line">
             <a:avLst/>
@@ -4095,14 +4795,14 @@
       </p:sp>
       <p:sp>
         <p:nvSpPr>
-          <p:cNvPr id="115" name="Line 18"/>
+          <p:cNvPr id="139" name="Line 31"/>
           <p:cNvSpPr/>
           <p:nvPr/>
         </p:nvSpPr>
         <p:spPr>
-          <a:xfrm>
-            <a:off x="1912320" y="4172040"/>
-            <a:ext cx="0" cy="502920"/>
+          <a:xfrm flipV="1">
+            <a:off x="8006040" y="6312600"/>
+            <a:ext cx="114480" cy="127080"/>
           </a:xfrm>
           <a:prstGeom prst="line">
             <a:avLst/>
@@ -4118,14 +4818,14 @@
       </p:sp>
       <p:sp>
         <p:nvSpPr>
-          <p:cNvPr id="116" name="TextShape 19"/>
+          <p:cNvPr id="140" name="TextShape 32"/>
           <p:cNvSpPr txBox="1"/>
           <p:nvPr/>
         </p:nvSpPr>
         <p:spPr>
           <a:xfrm>
-            <a:off x="695520" y="5072040"/>
-            <a:ext cx="1600200" cy="288360"/>
+            <a:off x="3040200" y="4559040"/>
+            <a:ext cx="2539080" cy="261720"/>
           </a:xfrm>
           <a:prstGeom prst="rect">
             <a:avLst/>
@@ -4135,44 +4835,71 @@
           <a:bodyPr bIns="45000" lIns="90000" rIns="90000" tIns="45000" wrap="none"/>
           <a:p>
             <a:r>
-              <a:rPr lang="en-US" sz="700"/>
-              <a:t>Torus eversion, rendered by Chéritat</a:t>
-            </a:r>
-            <a:endParaRPr/>
-          </a:p>
-        </p:txBody>
-      </p:sp>
-      <p:sp>
-        <p:nvSpPr>
-          <p:cNvPr id="117" name="CustomShape 20"/>
-          <p:cNvSpPr/>
-          <p:nvPr/>
-        </p:nvSpPr>
-        <p:spPr>
-          <a:xfrm>
-            <a:off x="180000" y="3215520"/>
-            <a:ext cx="2563200" cy="739800"/>
-          </a:xfrm>
-          <a:prstGeom prst="rect">
-            <a:avLst/>
-          </a:prstGeom>
-        </p:spPr>
-        <p:txBody>
-          <a:bodyPr bIns="45000" lIns="90000" rIns="90000" tIns="45000"/>
+              <a:rPr lang="en-US" sz="600"/>
+              <a:t>A highly twisted and bent curve unfolds into a circle with no twist, using gradient descent.</a:t>
+            </a:r>
+            <a:endParaRPr/>
+          </a:p>
+        </p:txBody>
+      </p:sp>
+      <p:sp>
+        <p:nvSpPr>
+          <p:cNvPr id="141" name="TextShape 33"/>
+          <p:cNvSpPr txBox="1"/>
+          <p:nvPr/>
+        </p:nvSpPr>
+        <p:spPr>
+          <a:xfrm>
+            <a:off x="5829120" y="179280"/>
+            <a:ext cx="3520440" cy="274680"/>
+          </a:xfrm>
+          <a:prstGeom prst="rect">
+            <a:avLst/>
+          </a:prstGeom>
+        </p:spPr>
+        <p:txBody>
+          <a:bodyPr bIns="45000" lIns="90000" rIns="90000" tIns="45000" wrap="none"/>
           <a:p>
             <a:pPr algn="ctr"/>
             <a:r>
               <a:rPr b="1" lang="en-US" sz="1300">
                 <a:solidFill>
+                  <a:srgbClr val="314004"/>
+                </a:solidFill>
+              </a:rPr>
+              <a:t>Optimizing the Eversion Process</a:t>
+            </a:r>
+            <a:endParaRPr/>
+          </a:p>
+        </p:txBody>
+      </p:sp>
+      <p:sp>
+        <p:nvSpPr>
+          <p:cNvPr id="142" name="TextShape 34"/>
+          <p:cNvSpPr txBox="1"/>
+          <p:nvPr/>
+        </p:nvSpPr>
+        <p:spPr>
+          <a:xfrm>
+            <a:off x="137160" y="1648800"/>
+            <a:ext cx="2606040" cy="1505160"/>
+          </a:xfrm>
+          <a:prstGeom prst="rect">
+            <a:avLst/>
+          </a:prstGeom>
+        </p:spPr>
+        <p:txBody>
+          <a:bodyPr bIns="45000" lIns="90000" rIns="90000" tIns="45000" wrap="none"/>
+          <a:p>
+            <a:pPr algn="ctr"/>
+            <a:r>
+              <a:rPr b="1" lang="en-US" sz="1300">
+                <a:solidFill>
                   <a:srgbClr val="000080"/>
                 </a:solidFill>
               </a:rPr>
-              <a:t>Torus Eversion</a:t>
-            </a:r>
-            <a:endParaRPr/>
-          </a:p>
-          <a:p>
-            <a:pPr algn="ctr"/>
+              <a:t>Smooth Transformations</a:t>
+            </a:r>
             <a:endParaRPr/>
           </a:p>
           <a:p>
@@ -4181,10 +4908,6 @@
               <a:buFont typeface="StarSymbol"/>
               <a:buChar char=""/>
             </a:pPr>
-            <a:r>
-              <a:rPr lang="en-US" sz="800"/>
-              <a:t>Turn an torus inside-out by deforming it into two Klein-bottle mouths attached to each other</a:t>
-            </a:r>
             <a:endParaRPr/>
           </a:p>
           <a:p>
@@ -4194,405 +4917,164 @@
               <a:buChar char=""/>
             </a:pPr>
             <a:r>
-              <a:rPr lang="en-US" sz="800"/>
-              <a:t>Proceed from halfway point by minimizing energy</a:t>
-            </a:r>
-            <a:endParaRPr/>
-          </a:p>
-        </p:txBody>
+              <a:rPr lang="en-US" sz="800">
+                <a:solidFill>
+                  <a:srgbClr val="000000"/>
+                </a:solidFill>
+              </a:rPr>
+              <a:t>Homotopy:smooth transformation from one surface to another without introducing sharp creases or tears</a:t>
+            </a:r>
+            <a:endParaRPr/>
+          </a:p>
+          <a:p>
+            <a:pPr>
+              <a:buSzPct val="45000"/>
+              <a:buFont typeface="StarSymbol"/>
+              <a:buChar char=""/>
+            </a:pPr>
+            <a:r>
+              <a:rPr lang="en-US" sz="800">
+                <a:solidFill>
+                  <a:srgbClr val="000000"/>
+                </a:solidFill>
+              </a:rPr>
+              <a:t>Want to visualize such transformations without specifying intermediate states, achieved by an optimization process over some energy functional</a:t>
+            </a:r>
+            <a:endParaRPr/>
+          </a:p>
+          <a:p>
+            <a:pPr>
+              <a:buSzPct val="45000"/>
+              <a:buFont typeface="StarSymbol"/>
+              <a:buChar char=""/>
+            </a:pPr>
+            <a:endParaRPr/>
+          </a:p>
+          <a:p>
+            <a:pPr>
+              <a:buSzPct val="45000"/>
+              <a:buFont typeface="StarSymbol"/>
+              <a:buChar char=""/>
+            </a:pPr>
+            <a:r>
+              <a:rPr lang="en-US" sz="800">
+                <a:solidFill>
+                  <a:srgbClr val="000000"/>
+                </a:solidFill>
+              </a:rPr>
+              <a:t>Everting a torus is a homotopy</a:t>
+            </a:r>
+            <a:endParaRPr/>
+          </a:p>
+          <a:p>
+            <a:pPr>
+              <a:buSzPct val="45000"/>
+              <a:buFont typeface="StarSymbol"/>
+              <a:buChar char=""/>
+            </a:pPr>
+            <a:r>
+              <a:rPr b="1" lang="en-US" sz="800">
+                <a:solidFill>
+                  <a:srgbClr val="000000"/>
+                </a:solidFill>
+              </a:rPr>
+              <a:t>Want to visualize eversion process proceeding </a:t>
+            </a:r>
+            <a:r>
+              <a:rPr b="1" i="1" lang="en-US" sz="800">
+                <a:solidFill>
+                  <a:srgbClr val="000000"/>
+                </a:solidFill>
+              </a:rPr>
+              <a:t>spontaneously</a:t>
+            </a:r>
+            <a:r>
+              <a:rPr b="1" lang="en-US" sz="800">
+                <a:solidFill>
+                  <a:srgbClr val="000000"/>
+                </a:solidFill>
+              </a:rPr>
+              <a:t> from some halfway point</a:t>
+            </a:r>
+            <a:endParaRPr/>
+          </a:p>
+        </p:txBody>
+      </p:sp>
+      <p:sp>
+        <p:nvSpPr>
+          <p:cNvPr id="143" name="TextShape 35"/>
+          <p:cNvSpPr txBox="1"/>
+          <p:nvPr/>
+        </p:nvSpPr>
+        <p:spPr>
+          <a:xfrm>
+            <a:off x="3177360" y="2738160"/>
+            <a:ext cx="937080" cy="176040"/>
+          </a:xfrm>
+          <a:prstGeom prst="rect">
+            <a:avLst/>
+          </a:prstGeom>
+        </p:spPr>
+        <p:txBody>
+          <a:bodyPr bIns="45000" lIns="90000" rIns="90000" tIns="45000" wrap="none"/>
+          <a:p>
+            <a:r>
+              <a:rPr lang="en-US" sz="600"/>
+              <a:t>Same homotopy class</a:t>
+            </a:r>
+            <a:endParaRPr/>
+          </a:p>
+        </p:txBody>
+      </p:sp>
+      <p:sp>
+        <p:nvSpPr>
+          <p:cNvPr id="144" name="Line 36"/>
+          <p:cNvSpPr/>
+          <p:nvPr/>
+        </p:nvSpPr>
+        <p:spPr>
+          <a:xfrm flipH="1" flipV="1">
+            <a:off x="3190680" y="2642040"/>
+            <a:ext cx="68400" cy="132120"/>
+          </a:xfrm>
+          <a:prstGeom prst="line">
+            <a:avLst/>
+          </a:prstGeom>
+          <a:ln w="9000">
+            <a:solidFill>
+              <a:srgbClr val="000000"/>
+            </a:solidFill>
+            <a:round/>
+            <a:tailEnd len="med" type="triangle" w="med"/>
+          </a:ln>
+        </p:spPr>
+      </p:sp>
+      <p:sp>
+        <p:nvSpPr>
+          <p:cNvPr id="145" name="Line 37"/>
+          <p:cNvSpPr/>
+          <p:nvPr/>
+        </p:nvSpPr>
+        <p:spPr>
+          <a:xfrm>
+            <a:off x="3533400" y="2907360"/>
+            <a:ext cx="91440" cy="137880"/>
+          </a:xfrm>
+          <a:prstGeom prst="line">
+            <a:avLst/>
+          </a:prstGeom>
+          <a:ln w="9000">
+            <a:solidFill>
+              <a:srgbClr val="000000"/>
+            </a:solidFill>
+            <a:round/>
+            <a:tailEnd len="med" type="triangle" w="med"/>
+          </a:ln>
+        </p:spPr>
       </p:sp>
       <p:pic>
         <p:nvPicPr>
-          <p:cNvPr descr="" id="118" name=""/>
-          <p:cNvPicPr/>
-          <p:nvPr/>
-        </p:nvPicPr>
-        <p:blipFill>
-          <a:blip r:embed="rId7"/>
-          <a:stretch>
-            <a:fillRect/>
-          </a:stretch>
-        </p:blipFill>
-        <p:spPr>
-          <a:xfrm>
-            <a:off x="695520" y="5314680"/>
-            <a:ext cx="1600560" cy="1060200"/>
-          </a:xfrm>
-          <a:prstGeom prst="rect">
-            <a:avLst/>
-          </a:prstGeom>
-        </p:spPr>
-      </p:pic>
-      <p:sp>
-        <p:nvSpPr>
-          <p:cNvPr id="119" name="TextShape 21"/>
-          <p:cNvSpPr txBox="1"/>
-          <p:nvPr/>
-        </p:nvSpPr>
-        <p:spPr>
-          <a:xfrm>
-            <a:off x="137160" y="6400440"/>
-            <a:ext cx="2606040" cy="288360"/>
-          </a:xfrm>
-          <a:prstGeom prst="rect">
-            <a:avLst/>
-          </a:prstGeom>
-        </p:spPr>
-        <p:txBody>
-          <a:bodyPr bIns="45000" lIns="90000" rIns="90000" tIns="45000" wrap="none"/>
-          <a:p>
-            <a:pPr algn="ctr"/>
-            <a:r>
-              <a:rPr lang="en-US" sz="700"/>
-              <a:t>Visualizing the Klein-bottle mouths. A possible halfway point in the eversion process.</a:t>
-            </a:r>
-            <a:endParaRPr/>
-          </a:p>
-        </p:txBody>
-      </p:sp>
-      <p:pic>
-        <p:nvPicPr>
-          <p:cNvPr descr="" id="120" name=""/>
-          <p:cNvPicPr/>
-          <p:nvPr/>
-        </p:nvPicPr>
-        <p:blipFill>
-          <a:blip r:embed="rId8"/>
-          <a:stretch>
-            <a:fillRect/>
-          </a:stretch>
-        </p:blipFill>
-        <p:spPr>
-          <a:xfrm>
-            <a:off x="5965200" y="825840"/>
-            <a:ext cx="914400" cy="914400"/>
-          </a:xfrm>
-          <a:prstGeom prst="rect">
-            <a:avLst/>
-          </a:prstGeom>
-        </p:spPr>
-      </p:pic>
-      <p:sp>
-        <p:nvSpPr>
-          <p:cNvPr id="121" name="TextShape 22"/>
-          <p:cNvSpPr txBox="1"/>
-          <p:nvPr/>
-        </p:nvSpPr>
-        <p:spPr>
-          <a:xfrm>
-            <a:off x="5919840" y="446400"/>
-            <a:ext cx="3383280" cy="347400"/>
-          </a:xfrm>
-          <a:prstGeom prst="rect">
-            <a:avLst/>
-          </a:prstGeom>
-        </p:spPr>
-        <p:txBody>
-          <a:bodyPr bIns="45000" lIns="90000" rIns="90000" tIns="45000" wrap="none"/>
-          <a:p>
-            <a:r>
-              <a:rPr b="1" lang="en-US" sz="600"/>
-              <a:t>A halfway point:</a:t>
-            </a:r>
-            <a:r>
-              <a:rPr lang="en-US" sz="600"/>
-              <a:t> </a:t>
-            </a:r>
-            <a:r>
-              <a:rPr lang="en-US" sz="600"/>
-              <a:t>First approach. Model two arms as separate, non-closed space curves, connected by end caps (not shown). Minimize  bending and twist of each arm separately. Both arms incur 180° twist for a total of 360° twist across both arms.</a:t>
-            </a:r>
-            <a:endParaRPr/>
-          </a:p>
-        </p:txBody>
-      </p:sp>
-      <p:pic>
-        <p:nvPicPr>
-          <p:cNvPr descr="" id="122" name=""/>
-          <p:cNvPicPr/>
-          <p:nvPr/>
-        </p:nvPicPr>
-        <p:blipFill>
-          <a:blip r:embed="rId9"/>
-          <a:stretch>
-            <a:fillRect/>
-          </a:stretch>
-        </p:blipFill>
-        <p:spPr>
-          <a:xfrm>
-            <a:off x="8000640" y="819000"/>
-            <a:ext cx="612720" cy="914400"/>
-          </a:xfrm>
-          <a:prstGeom prst="rect">
-            <a:avLst/>
-          </a:prstGeom>
-        </p:spPr>
-      </p:pic>
-      <p:sp>
-        <p:nvSpPr>
-          <p:cNvPr id="123" name="TextShape 23"/>
-          <p:cNvSpPr txBox="1"/>
-          <p:nvPr/>
-        </p:nvSpPr>
-        <p:spPr>
-          <a:xfrm>
-            <a:off x="8701920" y="779040"/>
-            <a:ext cx="624960" cy="1028520"/>
-          </a:xfrm>
-          <a:prstGeom prst="rect">
-            <a:avLst/>
-          </a:prstGeom>
-        </p:spPr>
-        <p:txBody>
-          <a:bodyPr bIns="45000" lIns="90000" rIns="90000" tIns="45000" wrap="none"/>
-          <a:p>
-            <a:r>
-              <a:rPr lang="en-US" sz="600"/>
-              <a:t>The stripe on the right arm is shown here. If an ant were to walk on the stripe, it would end up rotating 180°.</a:t>
-            </a:r>
-            <a:endParaRPr/>
-          </a:p>
-        </p:txBody>
-      </p:sp>
-      <p:pic>
-        <p:nvPicPr>
-          <p:cNvPr descr="" id="124" name=""/>
-          <p:cNvPicPr/>
-          <p:nvPr/>
-        </p:nvPicPr>
-        <p:blipFill>
-          <a:blip r:embed="rId10"/>
-          <a:stretch>
-            <a:fillRect/>
-          </a:stretch>
-        </p:blipFill>
-        <p:spPr>
-          <a:xfrm>
-            <a:off x="6998760" y="829080"/>
-            <a:ext cx="914400" cy="914400"/>
-          </a:xfrm>
-          <a:prstGeom prst="rect">
-            <a:avLst/>
-          </a:prstGeom>
-        </p:spPr>
-      </p:pic>
-      <p:sp>
-        <p:nvSpPr>
-          <p:cNvPr id="125" name="TextShape 24"/>
-          <p:cNvSpPr txBox="1"/>
-          <p:nvPr/>
-        </p:nvSpPr>
-        <p:spPr>
-          <a:xfrm>
-            <a:off x="5893200" y="1824840"/>
-            <a:ext cx="3383280" cy="347400"/>
-          </a:xfrm>
-          <a:prstGeom prst="rect">
-            <a:avLst/>
-          </a:prstGeom>
-        </p:spPr>
-        <p:txBody>
-          <a:bodyPr bIns="45000" lIns="90000" rIns="90000" tIns="45000" wrap="none"/>
-          <a:p>
-            <a:r>
-              <a:rPr b="1" lang="en-US" sz="600"/>
-              <a:t>Straightening out one arm:</a:t>
-            </a:r>
-            <a:r>
-              <a:rPr lang="en-US" sz="600"/>
-              <a:t> By allowing the green arm to straighten and the end caps to come closer together, the red arm is forced to incur all 360° of twist. The twist is then removed by folding the red arm until it is untwisted.</a:t>
-            </a:r>
-            <a:endParaRPr/>
-          </a:p>
-        </p:txBody>
-      </p:sp>
-      <p:pic>
-        <p:nvPicPr>
-          <p:cNvPr descr="" id="126" name=""/>
-          <p:cNvPicPr/>
-          <p:nvPr/>
-        </p:nvPicPr>
-        <p:blipFill>
-          <a:blip r:embed="rId11"/>
-          <a:stretch>
-            <a:fillRect/>
-          </a:stretch>
-        </p:blipFill>
-        <p:spPr>
-          <a:xfrm>
-            <a:off x="5831280" y="2178000"/>
-            <a:ext cx="914400" cy="914400"/>
-          </a:xfrm>
-          <a:prstGeom prst="rect">
-            <a:avLst/>
-          </a:prstGeom>
-        </p:spPr>
-      </p:pic>
-      <p:pic>
-        <p:nvPicPr>
-          <p:cNvPr descr="" id="127" name=""/>
-          <p:cNvPicPr/>
-          <p:nvPr/>
-        </p:nvPicPr>
-        <p:blipFill>
-          <a:blip r:embed="rId12"/>
-          <a:stretch>
-            <a:fillRect/>
-          </a:stretch>
-        </p:blipFill>
-        <p:spPr>
-          <a:xfrm>
-            <a:off x="7631280" y="2178000"/>
-            <a:ext cx="914400" cy="914400"/>
-          </a:xfrm>
-          <a:prstGeom prst="rect">
-            <a:avLst/>
-          </a:prstGeom>
-        </p:spPr>
-      </p:pic>
-      <p:pic>
-        <p:nvPicPr>
-          <p:cNvPr descr="" id="128" name=""/>
-          <p:cNvPicPr/>
-          <p:nvPr/>
-        </p:nvPicPr>
-        <p:blipFill>
-          <a:blip r:embed="rId13"/>
-          <a:stretch>
-            <a:fillRect/>
-          </a:stretch>
-        </p:blipFill>
-        <p:spPr>
-          <a:xfrm>
-            <a:off x="8459280" y="2178000"/>
-            <a:ext cx="914400" cy="914400"/>
-          </a:xfrm>
-          <a:prstGeom prst="rect">
-            <a:avLst/>
-          </a:prstGeom>
-        </p:spPr>
-      </p:pic>
-      <p:pic>
-        <p:nvPicPr>
-          <p:cNvPr descr="" id="129" name=""/>
-          <p:cNvPicPr/>
-          <p:nvPr/>
-        </p:nvPicPr>
-        <p:blipFill>
-          <a:blip r:embed="rId14"/>
-          <a:stretch>
-            <a:fillRect/>
-          </a:stretch>
-        </p:blipFill>
-        <p:spPr>
-          <a:xfrm>
-            <a:off x="6739200" y="2182320"/>
-            <a:ext cx="914400" cy="914400"/>
-          </a:xfrm>
-          <a:prstGeom prst="rect">
-            <a:avLst/>
-          </a:prstGeom>
-        </p:spPr>
-      </p:pic>
-      <p:sp>
-        <p:nvSpPr>
-          <p:cNvPr id="130" name="TextShape 25"/>
-          <p:cNvSpPr txBox="1"/>
-          <p:nvPr/>
-        </p:nvSpPr>
-        <p:spPr>
-          <a:xfrm>
-            <a:off x="5812200" y="4275360"/>
-            <a:ext cx="3520440" cy="307440"/>
-          </a:xfrm>
-          <a:prstGeom prst="rect">
-            <a:avLst/>
-          </a:prstGeom>
-        </p:spPr>
-        <p:txBody>
-          <a:bodyPr bIns="45000" lIns="90000" rIns="90000" tIns="45000" wrap="none"/>
-          <a:p>
-            <a:r>
-              <a:rPr b="1" lang="en-US" sz="600"/>
-              <a:t>Collapsing the straight arm:</a:t>
-            </a:r>
-            <a:r>
-              <a:rPr lang="en-US" sz="600"/>
-              <a:t> Finally, the green arm is shortened until it completely collapses and only the inverted torus remains.</a:t>
-            </a:r>
-            <a:endParaRPr/>
-          </a:p>
-        </p:txBody>
-      </p:sp>
-      <p:pic>
-        <p:nvPicPr>
-          <p:cNvPr descr="" id="131" name=""/>
-          <p:cNvPicPr/>
-          <p:nvPr/>
-        </p:nvPicPr>
-        <p:blipFill>
-          <a:blip r:embed="rId15"/>
-          <a:stretch>
-            <a:fillRect/>
-          </a:stretch>
-        </p:blipFill>
-        <p:spPr>
-          <a:xfrm>
-            <a:off x="7039800" y="3175560"/>
-            <a:ext cx="1097280" cy="1097280"/>
-          </a:xfrm>
-          <a:prstGeom prst="rect">
-            <a:avLst/>
-          </a:prstGeom>
-        </p:spPr>
-      </p:pic>
-      <p:pic>
-        <p:nvPicPr>
-          <p:cNvPr descr="" id="132" name=""/>
-          <p:cNvPicPr/>
-          <p:nvPr/>
-        </p:nvPicPr>
-        <p:blipFill>
-          <a:blip r:embed="rId16"/>
-          <a:stretch>
-            <a:fillRect/>
-          </a:stretch>
-        </p:blipFill>
-        <p:spPr>
-          <a:xfrm>
-            <a:off x="5851080" y="3175920"/>
-            <a:ext cx="1097280" cy="1097280"/>
-          </a:xfrm>
-          <a:prstGeom prst="rect">
-            <a:avLst/>
-          </a:prstGeom>
-        </p:spPr>
-      </p:pic>
-      <p:pic>
-        <p:nvPicPr>
-          <p:cNvPr descr="" id="133" name=""/>
-          <p:cNvPicPr/>
-          <p:nvPr/>
-        </p:nvPicPr>
-        <p:blipFill>
-          <a:blip r:embed="rId17"/>
-          <a:stretch>
-            <a:fillRect/>
-          </a:stretch>
-        </p:blipFill>
-        <p:spPr>
-          <a:xfrm>
-            <a:off x="8235360" y="3175560"/>
-            <a:ext cx="1097280" cy="1097280"/>
-          </a:xfrm>
-          <a:prstGeom prst="rect">
-            <a:avLst/>
-          </a:prstGeom>
-        </p:spPr>
-      </p:pic>
-      <p:pic>
-        <p:nvPicPr>
-          <p:cNvPr descr="" id="134" name=""/>
+          <p:cNvPr descr="" id="146" name=""/>
           <p:cNvPicPr/>
           <p:nvPr/>
         </p:nvPicPr>
@@ -4604,8 +5086,8 @@
         </p:blipFill>
         <p:spPr>
           <a:xfrm>
-            <a:off x="3012480" y="4845600"/>
-            <a:ext cx="685440" cy="685440"/>
+            <a:off x="2990160" y="831960"/>
+            <a:ext cx="1234440" cy="768240"/>
           </a:xfrm>
           <a:prstGeom prst="rect">
             <a:avLst/>
@@ -4614,7 +5096,7 @@
       </p:pic>
       <p:pic>
         <p:nvPicPr>
-          <p:cNvPr descr="" id="135" name=""/>
+          <p:cNvPr descr="" id="147" name=""/>
           <p:cNvPicPr/>
           <p:nvPr/>
         </p:nvPicPr>
@@ -4626,8 +5108,8 @@
         </p:blipFill>
         <p:spPr>
           <a:xfrm>
-            <a:off x="3687840" y="4887000"/>
-            <a:ext cx="566640" cy="603000"/>
+            <a:off x="4297680" y="831960"/>
+            <a:ext cx="1234440" cy="768240"/>
           </a:xfrm>
           <a:prstGeom prst="rect">
             <a:avLst/>
@@ -4636,7 +5118,7 @@
       </p:pic>
       <p:pic>
         <p:nvPicPr>
-          <p:cNvPr descr="" id="136" name=""/>
+          <p:cNvPr descr="" id="148" name=""/>
           <p:cNvPicPr/>
           <p:nvPr/>
         </p:nvPicPr>
@@ -4648,8 +5130,8 @@
         </p:blipFill>
         <p:spPr>
           <a:xfrm>
-            <a:off x="4197240" y="4831200"/>
-            <a:ext cx="685440" cy="731160"/>
+            <a:off x="2990160" y="1792080"/>
+            <a:ext cx="1234440" cy="612720"/>
           </a:xfrm>
           <a:prstGeom prst="rect">
             <a:avLst/>
@@ -4658,7 +5140,7 @@
       </p:pic>
       <p:pic>
         <p:nvPicPr>
-          <p:cNvPr descr="" id="137" name=""/>
+          <p:cNvPr descr="" id="149" name=""/>
           <p:cNvPicPr/>
           <p:nvPr/>
         </p:nvPicPr>
@@ -4670,119 +5152,17 @@
         </p:blipFill>
         <p:spPr>
           <a:xfrm>
-            <a:off x="4854240" y="4875120"/>
-            <a:ext cx="633240" cy="677520"/>
+            <a:off x="4297680" y="1792080"/>
+            <a:ext cx="1234440" cy="612720"/>
           </a:xfrm>
           <a:prstGeom prst="rect">
             <a:avLst/>
           </a:prstGeom>
         </p:spPr>
       </p:pic>
-      <p:sp>
-        <p:nvSpPr>
-          <p:cNvPr id="138" name="TextShape 26"/>
-          <p:cNvSpPr txBox="1"/>
-          <p:nvPr/>
-        </p:nvSpPr>
-        <p:spPr>
-          <a:xfrm>
-            <a:off x="2834640" y="5615280"/>
-            <a:ext cx="2744640" cy="1082160"/>
-          </a:xfrm>
-          <a:prstGeom prst="rect">
-            <a:avLst/>
-          </a:prstGeom>
-        </p:spPr>
-        <p:txBody>
-          <a:bodyPr bIns="45000" lIns="90000" rIns="90000" tIns="45000" wrap="none"/>
-          <a:p>
-            <a:pPr algn="ctr"/>
-            <a:r>
-              <a:rPr b="1" lang="en-US" sz="1300">
-                <a:solidFill>
-                  <a:srgbClr val="99284c"/>
-                </a:solidFill>
-              </a:rPr>
-              <a:t>Energy Functionals</a:t>
-            </a:r>
-            <a:endParaRPr/>
-          </a:p>
-          <a:p>
-            <a:endParaRPr/>
-          </a:p>
-          <a:p>
-            <a:pPr>
-              <a:buSzPct val="45000"/>
-              <a:buFont typeface="StarSymbol"/>
-              <a:buChar char=""/>
-            </a:pPr>
-            <a:r>
-              <a:rPr b="1" lang="en-US" sz="700"/>
-              <a:t>Bending:</a:t>
-            </a:r>
-            <a:r>
-              <a:rPr lang="en-US" sz="700"/>
-              <a:t> Compute angle between two struts and take deviation from collinearity</a:t>
-            </a:r>
-            <a:endParaRPr/>
-          </a:p>
-          <a:p>
-            <a:pPr>
-              <a:buSzPct val="45000"/>
-              <a:buFont typeface="StarSymbol"/>
-              <a:buChar char=""/>
-            </a:pPr>
-            <a:r>
-              <a:rPr b="1" lang="en-US" sz="700"/>
-              <a:t>Twisting:</a:t>
-            </a:r>
-            <a:r>
-              <a:rPr lang="en-US" sz="700"/>
-              <a:t> Using rotation minimizing frames,</a:t>
-            </a:r>
-            <a:endParaRPr/>
-          </a:p>
-          <a:p>
-            <a:pPr lvl="1">
-              <a:buSzPct val="45000"/>
-              <a:buFont typeface="StarSymbol"/>
-              <a:buChar char=""/>
-            </a:pPr>
-            <a:r>
-              <a:rPr lang="en-US" sz="700"/>
-              <a:t>Closed Curves: compare beginning and end orientations</a:t>
-            </a:r>
-            <a:endParaRPr/>
-          </a:p>
-          <a:p>
-            <a:pPr lvl="1">
-              <a:buSzPct val="45000"/>
-              <a:buFont typeface="StarSymbol"/>
-              <a:buChar char=""/>
-            </a:pPr>
-            <a:r>
-              <a:rPr lang="en-US" sz="700"/>
-              <a:t>Non-closed curves: forward project normal vectors and compare to a priori expected ending orientation</a:t>
-            </a:r>
-            <a:endParaRPr/>
-          </a:p>
-          <a:p>
-            <a:pPr>
-              <a:buSzPct val="45000"/>
-              <a:buFont typeface="StarSymbol"/>
-              <a:buChar char=""/>
-            </a:pPr>
-            <a:r>
-              <a:rPr lang="en-US" sz="700"/>
-              <a:t>Can weigh these parts to trade-off between them</a:t>
-            </a:r>
-            <a:endParaRPr/>
-          </a:p>
-        </p:txBody>
-      </p:sp>
       <p:pic>
         <p:nvPicPr>
-          <p:cNvPr descr="" id="139" name=""/>
+          <p:cNvPr descr="" id="150" name=""/>
           <p:cNvPicPr/>
           <p:nvPr/>
         </p:nvPicPr>
@@ -4794,306 +5174,14 @@
         </p:blipFill>
         <p:spPr>
           <a:xfrm>
-            <a:off x="6451560" y="5448600"/>
-            <a:ext cx="2286000" cy="777240"/>
+            <a:off x="4142160" y="2734200"/>
+            <a:ext cx="1234440" cy="612720"/>
           </a:xfrm>
           <a:prstGeom prst="rect">
             <a:avLst/>
           </a:prstGeom>
         </p:spPr>
       </p:pic>
-      <p:sp>
-        <p:nvSpPr>
-          <p:cNvPr id="140" name="TextShape 27"/>
-          <p:cNvSpPr txBox="1"/>
-          <p:nvPr/>
-        </p:nvSpPr>
-        <p:spPr>
-          <a:xfrm>
-            <a:off x="6337440" y="6171480"/>
-            <a:ext cx="868680" cy="433080"/>
-          </a:xfrm>
-          <a:prstGeom prst="rect">
-            <a:avLst/>
-          </a:prstGeom>
-        </p:spPr>
-        <p:txBody>
-          <a:bodyPr bIns="45000" lIns="90000" rIns="90000" tIns="45000" wrap="none"/>
-          <a:p>
-            <a:r>
-              <a:rPr lang="en-US" sz="600"/>
-              <a:t>Bending calculated as deviation of adjacent patches from co-planarity</a:t>
-            </a:r>
-            <a:endParaRPr/>
-          </a:p>
-        </p:txBody>
-      </p:sp>
-      <p:sp>
-        <p:nvSpPr>
-          <p:cNvPr id="141" name="TextShape 28"/>
-          <p:cNvSpPr txBox="1"/>
-          <p:nvPr/>
-        </p:nvSpPr>
-        <p:spPr>
-          <a:xfrm>
-            <a:off x="8065800" y="6171840"/>
-            <a:ext cx="868680" cy="433080"/>
-          </a:xfrm>
-          <a:prstGeom prst="rect">
-            <a:avLst/>
-          </a:prstGeom>
-        </p:spPr>
-        <p:txBody>
-          <a:bodyPr bIns="45000" lIns="90000" rIns="90000" tIns="45000" wrap="none"/>
-          <a:p>
-            <a:r>
-              <a:rPr lang="en-US" sz="600"/>
-              <a:t>Twisting calculated based on deviation of edges from right angles.</a:t>
-            </a:r>
-            <a:endParaRPr/>
-          </a:p>
-        </p:txBody>
-      </p:sp>
-      <p:sp>
-        <p:nvSpPr>
-          <p:cNvPr id="142" name="TextShape 29"/>
-          <p:cNvSpPr txBox="1"/>
-          <p:nvPr/>
-        </p:nvSpPr>
-        <p:spPr>
-          <a:xfrm>
-            <a:off x="7183080" y="6439680"/>
-            <a:ext cx="891720" cy="261720"/>
-          </a:xfrm>
-          <a:prstGeom prst="rect">
-            <a:avLst/>
-          </a:prstGeom>
-        </p:spPr>
-        <p:txBody>
-          <a:bodyPr bIns="45000" lIns="90000" rIns="90000" tIns="45000" wrap="none"/>
-          <a:p>
-            <a:r>
-              <a:rPr lang="en-US" sz="600"/>
-              <a:t>Integrate these over entire surface area</a:t>
-            </a:r>
-            <a:endParaRPr/>
-          </a:p>
-        </p:txBody>
-      </p:sp>
-      <p:sp>
-        <p:nvSpPr>
-          <p:cNvPr id="143" name="Line 30"/>
-          <p:cNvSpPr/>
-          <p:nvPr/>
-        </p:nvSpPr>
-        <p:spPr>
-          <a:xfrm flipH="1" flipV="1">
-            <a:off x="7114680" y="6335640"/>
-            <a:ext cx="137160" cy="137160"/>
-          </a:xfrm>
-          <a:prstGeom prst="line">
-            <a:avLst/>
-          </a:prstGeom>
-          <a:ln w="9000">
-            <a:solidFill>
-              <a:srgbClr val="000000"/>
-            </a:solidFill>
-            <a:round/>
-            <a:tailEnd len="med" type="triangle" w="med"/>
-          </a:ln>
-        </p:spPr>
-      </p:sp>
-      <p:sp>
-        <p:nvSpPr>
-          <p:cNvPr id="144" name="Line 31"/>
-          <p:cNvSpPr/>
-          <p:nvPr/>
-        </p:nvSpPr>
-        <p:spPr>
-          <a:xfrm flipV="1">
-            <a:off x="8006040" y="6312600"/>
-            <a:ext cx="114480" cy="127080"/>
-          </a:xfrm>
-          <a:prstGeom prst="line">
-            <a:avLst/>
-          </a:prstGeom>
-          <a:ln w="9000">
-            <a:solidFill>
-              <a:srgbClr val="000000"/>
-            </a:solidFill>
-            <a:round/>
-            <a:tailEnd len="med" type="triangle" w="med"/>
-          </a:ln>
-        </p:spPr>
-      </p:sp>
-      <p:sp>
-        <p:nvSpPr>
-          <p:cNvPr id="145" name="TextShape 32"/>
-          <p:cNvSpPr txBox="1"/>
-          <p:nvPr/>
-        </p:nvSpPr>
-        <p:spPr>
-          <a:xfrm>
-            <a:off x="3040200" y="4559040"/>
-            <a:ext cx="2539080" cy="261720"/>
-          </a:xfrm>
-          <a:prstGeom prst="rect">
-            <a:avLst/>
-          </a:prstGeom>
-        </p:spPr>
-        <p:txBody>
-          <a:bodyPr bIns="45000" lIns="90000" rIns="90000" tIns="45000" wrap="none"/>
-          <a:p>
-            <a:r>
-              <a:rPr lang="en-US" sz="600"/>
-              <a:t>A highly twisted and bent curve unfolds into a circle with no twist, using gradient descent.</a:t>
-            </a:r>
-            <a:endParaRPr/>
-          </a:p>
-        </p:txBody>
-      </p:sp>
-      <p:sp>
-        <p:nvSpPr>
-          <p:cNvPr id="146" name="TextShape 33"/>
-          <p:cNvSpPr txBox="1"/>
-          <p:nvPr/>
-        </p:nvSpPr>
-        <p:spPr>
-          <a:xfrm>
-            <a:off x="5829120" y="179280"/>
-            <a:ext cx="3520440" cy="274680"/>
-          </a:xfrm>
-          <a:prstGeom prst="rect">
-            <a:avLst/>
-          </a:prstGeom>
-        </p:spPr>
-        <p:txBody>
-          <a:bodyPr bIns="45000" lIns="90000" rIns="90000" tIns="45000" wrap="none"/>
-          <a:p>
-            <a:pPr algn="ctr"/>
-            <a:r>
-              <a:rPr b="1" lang="en-US" sz="1300">
-                <a:solidFill>
-                  <a:srgbClr val="314004"/>
-                </a:solidFill>
-              </a:rPr>
-              <a:t>Optimizing the Eversion Process</a:t>
-            </a:r>
-            <a:endParaRPr/>
-          </a:p>
-        </p:txBody>
-      </p:sp>
-      <p:sp>
-        <p:nvSpPr>
-          <p:cNvPr id="147" name="TextShape 34"/>
-          <p:cNvSpPr txBox="1"/>
-          <p:nvPr/>
-        </p:nvSpPr>
-        <p:spPr>
-          <a:xfrm>
-            <a:off x="137160" y="1756800"/>
-            <a:ext cx="2606040" cy="1458720"/>
-          </a:xfrm>
-          <a:prstGeom prst="rect">
-            <a:avLst/>
-          </a:prstGeom>
-        </p:spPr>
-        <p:txBody>
-          <a:bodyPr bIns="45000" lIns="90000" rIns="90000" tIns="45000" wrap="none"/>
-          <a:p>
-            <a:pPr algn="ctr"/>
-            <a:r>
-              <a:rPr b="1" lang="en-US" sz="1300">
-                <a:solidFill>
-                  <a:srgbClr val="000080"/>
-                </a:solidFill>
-              </a:rPr>
-              <a:t>Smooth Transformations</a:t>
-            </a:r>
-            <a:endParaRPr/>
-          </a:p>
-          <a:p>
-            <a:pPr>
-              <a:buSzPct val="45000"/>
-              <a:buFont typeface="StarSymbol"/>
-              <a:buChar char=""/>
-            </a:pPr>
-            <a:endParaRPr/>
-          </a:p>
-          <a:p>
-            <a:pPr>
-              <a:buSzPct val="45000"/>
-              <a:buFont typeface="StarSymbol"/>
-              <a:buChar char=""/>
-            </a:pPr>
-            <a:r>
-              <a:rPr lang="en-US" sz="800">
-                <a:solidFill>
-                  <a:srgbClr val="000000"/>
-                </a:solidFill>
-              </a:rPr>
-              <a:t>Homotopy:smooth transformation from one surface to another without introducing sharp creases or tears</a:t>
-            </a:r>
-            <a:endParaRPr/>
-          </a:p>
-          <a:p>
-            <a:pPr>
-              <a:buSzPct val="45000"/>
-              <a:buFont typeface="StarSymbol"/>
-              <a:buChar char=""/>
-            </a:pPr>
-            <a:r>
-              <a:rPr lang="en-US" sz="800">
-                <a:solidFill>
-                  <a:srgbClr val="000000"/>
-                </a:solidFill>
-              </a:rPr>
-              <a:t>Want to visualize such transformations without specifying intermediate states</a:t>
-            </a:r>
-            <a:endParaRPr/>
-          </a:p>
-          <a:p>
-            <a:pPr>
-              <a:buSzPct val="45000"/>
-              <a:buFont typeface="StarSymbol"/>
-              <a:buChar char=""/>
-            </a:pPr>
-            <a:endParaRPr/>
-          </a:p>
-          <a:p>
-            <a:pPr>
-              <a:buSzPct val="45000"/>
-              <a:buFont typeface="StarSymbol"/>
-              <a:buChar char=""/>
-            </a:pPr>
-            <a:r>
-              <a:rPr lang="en-US" sz="800">
-                <a:solidFill>
-                  <a:srgbClr val="000000"/>
-                </a:solidFill>
-              </a:rPr>
-              <a:t>Everting a torus is a homotopy</a:t>
-            </a:r>
-            <a:endParaRPr/>
-          </a:p>
-          <a:p>
-            <a:pPr>
-              <a:buSzPct val="45000"/>
-              <a:buFont typeface="StarSymbol"/>
-              <a:buChar char=""/>
-            </a:pPr>
-            <a:r>
-              <a:rPr b="1" lang="en-US" sz="800">
-                <a:solidFill>
-                  <a:srgbClr val="000000"/>
-                </a:solidFill>
-              </a:rPr>
-              <a:t>Want to visualize eversion process proceeding spontaneously from some halfway point</a:t>
-            </a:r>
-            <a:endParaRPr/>
-          </a:p>
-        </p:txBody>
-      </p:sp>
     </p:spTree>
   </p:cSld>
   <p:timing>

</xml_diff>